<commit_message>
merged input from Alex and hackathon photo
</commit_message>
<xml_diff>
--- a/122/NETCONF/draft-ietf-netconf-yp-transport-capabilities-00.pptx
+++ b/122/NETCONF/draft-ietf-netconf-yp-transport-capabilities-00.pptx
@@ -122,7 +122,7 @@
 <file path=ppt/revisionInfo.xml><?xml version="1.0" encoding="utf-8"?>
 <p1510:revInfo xmlns:a="http://schemas.openxmlformats.org/drawingml/2006/main" xmlns:r="http://schemas.openxmlformats.org/officeDocument/2006/relationships" xmlns:p1510="http://schemas.microsoft.com/office/powerpoint/2015/10/main">
   <p1510:revLst>
-    <p1510:client id="{DDDC966E-BE0A-4622-8356-AE16CAED623C}" v="4" dt="2025-03-16T01:39:29.292"/>
+    <p1510:client id="{DDDC966E-BE0A-4622-8356-AE16CAED623C}" v="6" dt="2025-03-16T04:13:16.381"/>
   </p1510:revLst>
 </p1510:revInfo>
 </file>
@@ -533,7 +533,7 @@
   <pc:docChgLst>
     <pc:chgData name="Graf Thomas, INI-NET-VNC-E2E" userId="487bc3e3-9ce7-4cdd-b7b4-8899ea88d289" providerId="ADAL" clId="{DDDC966E-BE0A-4622-8356-AE16CAED623C}"/>
     <pc:docChg chg="undo custSel addSld delSld modSld sldOrd">
-      <pc:chgData name="Graf Thomas, INI-NET-VNC-E2E" userId="487bc3e3-9ce7-4cdd-b7b4-8899ea88d289" providerId="ADAL" clId="{DDDC966E-BE0A-4622-8356-AE16CAED623C}" dt="2025-03-16T01:38:50.232" v="452" actId="20577"/>
+      <pc:chgData name="Graf Thomas, INI-NET-VNC-E2E" userId="487bc3e3-9ce7-4cdd-b7b4-8899ea88d289" providerId="ADAL" clId="{DDDC966E-BE0A-4622-8356-AE16CAED623C}" dt="2025-03-16T04:12:40.511" v="552" actId="20577"/>
       <pc:docMkLst>
         <pc:docMk/>
       </pc:docMkLst>
@@ -598,13 +598,13 @@
         </pc:spChg>
       </pc:sldChg>
       <pc:sldChg chg="modSp mod ord">
-        <pc:chgData name="Graf Thomas, INI-NET-VNC-E2E" userId="487bc3e3-9ce7-4cdd-b7b4-8899ea88d289" providerId="ADAL" clId="{DDDC966E-BE0A-4622-8356-AE16CAED623C}" dt="2025-03-16T01:37:46.787" v="434" actId="20577"/>
+        <pc:chgData name="Graf Thomas, INI-NET-VNC-E2E" userId="487bc3e3-9ce7-4cdd-b7b4-8899ea88d289" providerId="ADAL" clId="{DDDC966E-BE0A-4622-8356-AE16CAED623C}" dt="2025-03-16T04:12:40.511" v="552" actId="20577"/>
         <pc:sldMkLst>
           <pc:docMk/>
           <pc:sldMk cId="3562000331" sldId="2145706269"/>
         </pc:sldMkLst>
         <pc:spChg chg="mod">
-          <ac:chgData name="Graf Thomas, INI-NET-VNC-E2E" userId="487bc3e3-9ce7-4cdd-b7b4-8899ea88d289" providerId="ADAL" clId="{DDDC966E-BE0A-4622-8356-AE16CAED623C}" dt="2025-03-16T01:37:46.787" v="434" actId="20577"/>
+          <ac:chgData name="Graf Thomas, INI-NET-VNC-E2E" userId="487bc3e3-9ce7-4cdd-b7b4-8899ea88d289" providerId="ADAL" clId="{DDDC966E-BE0A-4622-8356-AE16CAED623C}" dt="2025-03-16T04:12:40.511" v="552" actId="20577"/>
           <ac:spMkLst>
             <pc:docMk/>
             <pc:sldMk cId="3562000331" sldId="2145706269"/>
@@ -612,12 +612,20 @@
           </ac:spMkLst>
         </pc:spChg>
       </pc:sldChg>
-      <pc:sldChg chg="ord">
-        <pc:chgData name="Graf Thomas, INI-NET-VNC-E2E" userId="487bc3e3-9ce7-4cdd-b7b4-8899ea88d289" providerId="ADAL" clId="{DDDC966E-BE0A-4622-8356-AE16CAED623C}" dt="2025-03-16T01:29:39.043" v="314"/>
+      <pc:sldChg chg="modSp mod ord">
+        <pc:chgData name="Graf Thomas, INI-NET-VNC-E2E" userId="487bc3e3-9ce7-4cdd-b7b4-8899ea88d289" providerId="ADAL" clId="{DDDC966E-BE0A-4622-8356-AE16CAED623C}" dt="2025-03-16T04:07:11.971" v="473" actId="20577"/>
         <pc:sldMkLst>
           <pc:docMk/>
           <pc:sldMk cId="2732367690" sldId="2145706270"/>
         </pc:sldMkLst>
+        <pc:spChg chg="mod">
+          <ac:chgData name="Graf Thomas, INI-NET-VNC-E2E" userId="487bc3e3-9ce7-4cdd-b7b4-8899ea88d289" providerId="ADAL" clId="{DDDC966E-BE0A-4622-8356-AE16CAED623C}" dt="2025-03-16T04:07:11.971" v="473" actId="20577"/>
+          <ac:spMkLst>
+            <pc:docMk/>
+            <pc:sldMk cId="2732367690" sldId="2145706270"/>
+            <ac:spMk id="3" creationId="{29C0DFD4-432D-4B0C-93DF-790441DCF5B9}"/>
+          </ac:spMkLst>
+        </pc:spChg>
       </pc:sldChg>
       <pc:sldChg chg="addSp delSp modSp add del mod ord">
         <pc:chgData name="Graf Thomas, INI-NET-VNC-E2E" userId="487bc3e3-9ce7-4cdd-b7b4-8899ea88d289" providerId="ADAL" clId="{DDDC966E-BE0A-4622-8356-AE16CAED623C}" dt="2025-03-16T01:37:27.267" v="430" actId="47"/>
@@ -5632,7 +5640,7 @@
               <a:rPr lang="en-US" sz="1700" dirty="0">
                 <a:hlinkClick r:id="rId3"/>
               </a:rPr>
-              <a:t>draft-</a:t>
+              <a:t>Section 4.1 of draft-</a:t>
             </a:r>
             <a:r>
               <a:rPr lang="en-US" sz="1700" dirty="0" err="1">
@@ -5660,7 +5668,7 @@
             </a:r>
             <a:r>
               <a:rPr lang="en-US" sz="1700" dirty="0"/>
-              <a:t> describes an Architecture for YANG-Push to Message Broker Integration.</a:t>
+              <a:t> describes the YANG-Push subscription workflow where before the subscription configuration the transport, notification and subscription capabilities are being discovered first.</a:t>
             </a:r>
           </a:p>
           <a:p>
@@ -5668,7 +5676,7 @@
               <a:rPr lang="en-US" sz="1700" dirty="0">
                 <a:hlinkClick r:id="rId4"/>
               </a:rPr>
-              <a:t>Section 4.1 of draft-</a:t>
+              <a:t>draft-</a:t>
             </a:r>
             <a:r>
               <a:rPr lang="en-US" sz="1700" dirty="0" err="1">
@@ -5680,54 +5688,18 @@
               <a:rPr lang="en-US" sz="1700" dirty="0">
                 <a:hlinkClick r:id="rId4"/>
               </a:rPr>
-              <a:t>-</a:t>
+              <a:t>-netconf-</a:t>
             </a:r>
             <a:r>
               <a:rPr lang="en-US" sz="1700" dirty="0" err="1">
                 <a:hlinkClick r:id="rId4"/>
               </a:rPr>
-              <a:t>nmop</a:t>
+              <a:t>yp</a:t>
             </a:r>
             <a:r>
               <a:rPr lang="en-US" sz="1700" dirty="0">
                 <a:hlinkClick r:id="rId4"/>
               </a:rPr>
-              <a:t>-yang-message-broker-integration</a:t>
-            </a:r>
-            <a:r>
-              <a:rPr lang="en-US" sz="1700" dirty="0"/>
-              <a:t> describes the YANG-Push subscription workflow where before the subscription configuration the transport, notification and subscription capabilities are being discovered first.</a:t>
-            </a:r>
-          </a:p>
-          <a:p>
-            <a:r>
-              <a:rPr lang="en-US" sz="1700" dirty="0">
-                <a:hlinkClick r:id="rId3"/>
-              </a:rPr>
-              <a:t>draft-</a:t>
-            </a:r>
-            <a:r>
-              <a:rPr lang="en-US" sz="1700" dirty="0" err="1">
-                <a:hlinkClick r:id="rId3"/>
-              </a:rPr>
-              <a:t>netana</a:t>
-            </a:r>
-            <a:r>
-              <a:rPr lang="en-US" sz="1700" dirty="0">
-                <a:hlinkClick r:id="rId3"/>
-              </a:rPr>
-              <a:t>-netconf-</a:t>
-            </a:r>
-            <a:r>
-              <a:rPr lang="en-US" sz="1700" dirty="0" err="1">
-                <a:hlinkClick r:id="rId3"/>
-              </a:rPr>
-              <a:t>yp</a:t>
-            </a:r>
-            <a:r>
-              <a:rPr lang="en-US" sz="1700" dirty="0">
-                <a:hlinkClick r:id="rId3"/>
-              </a:rPr>
               <a:t>-transport-capabilities</a:t>
             </a:r>
             <a:r>
@@ -5740,69 +5712,21 @@
             </a:r>
             <a:r>
               <a:rPr lang="en-US" sz="1700" dirty="0"/>
-              <a:t>-system-capabilities" for discovering transport, </a:t>
-            </a:r>
-            <a:r>
-              <a:rPr lang="en-US" sz="1700" dirty="0">
-                <a:hlinkClick r:id="rId5"/>
-              </a:rPr>
-              <a:t>Section 3.2 of draft-</a:t>
-            </a:r>
-            <a:r>
-              <a:rPr lang="en-US" sz="1700" dirty="0" err="1">
-                <a:hlinkClick r:id="rId5"/>
-              </a:rPr>
-              <a:t>netana</a:t>
-            </a:r>
-            <a:r>
-              <a:rPr lang="en-US" sz="1700" dirty="0">
-                <a:hlinkClick r:id="rId5"/>
-              </a:rPr>
-              <a:t>-netconf-</a:t>
-            </a:r>
-            <a:r>
-              <a:rPr lang="en-US" sz="1700" dirty="0" err="1">
-                <a:hlinkClick r:id="rId5"/>
-              </a:rPr>
-              <a:t>notif</a:t>
-            </a:r>
-            <a:r>
-              <a:rPr lang="en-US" sz="1700" dirty="0">
-                <a:hlinkClick r:id="rId5"/>
-              </a:rPr>
-              <a:t>-envelope </a:t>
-            </a:r>
+              <a:t>-system-capabilities" for discovering transport.</a:t>
+            </a:r>
+          </a:p>
+          <a:p>
             <a:r>
               <a:rPr lang="en-US" sz="1700" dirty="0"/>
-              <a:t>for notification metadata and </a:t>
-            </a:r>
-            <a:r>
-              <a:rPr lang="en-US" sz="1700" dirty="0">
-                <a:hlinkClick r:id="rId6"/>
-              </a:rPr>
-              <a:t>Section 4 of draft-</a:t>
-            </a:r>
-            <a:r>
-              <a:rPr lang="en-US" sz="1700" dirty="0" err="1">
-                <a:hlinkClick r:id="rId6"/>
-              </a:rPr>
-              <a:t>tgraf</a:t>
-            </a:r>
-            <a:r>
-              <a:rPr lang="en-US" sz="1700" dirty="0">
-                <a:hlinkClick r:id="rId6"/>
-              </a:rPr>
-              <a:t>-netconf-yang-push-observation-time </a:t>
+              <a:t>This allows a client to discover all YANG-Push </a:t>
+            </a:r>
+            <a:r>
+              <a:rPr lang="en-US" sz="1700" dirty="0" err="1"/>
+              <a:t>pulisher</a:t>
             </a:r>
             <a:r>
               <a:rPr lang="en-US" sz="1700" dirty="0"/>
-              <a:t>for observation timestamping.</a:t>
-            </a:r>
-          </a:p>
-          <a:p>
-            <a:r>
-              <a:rPr lang="en-US" sz="1700" dirty="0"/>
-              <a:t>This allows a client to discover all YANG-Push server capabilities to enable the automation of the YANG-Push subscription configuration workflow depending on the YANG-Push server capabilities .</a:t>
+              <a:t> capabilities to enable the automation of the YANG-Push subscription configuration workflow depending on the YANG-Push server capabilities.</a:t>
             </a:r>
           </a:p>
         </p:txBody>
@@ -5856,7 +5780,7 @@
           <p:nvPr/>
         </p:nvPicPr>
         <p:blipFill>
-          <a:blip r:embed="rId7"/>
+          <a:blip r:embed="rId5"/>
           <a:stretch>
             <a:fillRect/>
           </a:stretch>
@@ -6086,7 +6010,7 @@
             <a:pPr lvl="1"/>
             <a:r>
               <a:rPr lang="en-US" sz="1700" dirty="0"/>
-              <a:t>Specification of transport protocols the client can request to establish a </a:t>
+              <a:t>Specification of which transport protocols are supported by the router (</a:t>
             </a:r>
             <a:r>
               <a:rPr lang="en-US" sz="1700" dirty="0">
@@ -6126,7 +6050,7 @@
             </a:r>
             <a:r>
               <a:rPr lang="en-US" sz="1700" dirty="0"/>
-              <a:t> or </a:t>
+              <a:t>, </a:t>
             </a:r>
             <a:r>
               <a:rPr lang="en-US" sz="1700" dirty="0">
@@ -6154,24 +6078,34 @@
             </a:r>
             <a:r>
               <a:rPr lang="en-US" sz="1700" dirty="0"/>
-              <a:t> configured transport connection;</a:t>
+              <a:t>)</a:t>
             </a:r>
           </a:p>
           <a:p>
             <a:pPr lvl="1"/>
             <a:r>
               <a:rPr lang="en-US" sz="1700" dirty="0"/>
-              <a:t>Specification of transport encoding, such as JSON or XML as defined in </a:t>
+              <a:t>Specification of which YANG notification encodings are supported by the transport protocol (JSON </a:t>
             </a:r>
             <a:r>
               <a:rPr lang="en-US" sz="1700" dirty="0">
                 <a:hlinkClick r:id="rId5"/>
               </a:rPr>
-              <a:t>RFC 8040 </a:t>
+              <a:t>RFC 8040, </a:t>
             </a:r>
             <a:r>
               <a:rPr lang="en-US" sz="1700" dirty="0"/>
-              <a:t>or CBOR as defined in </a:t>
+              <a:t>XML </a:t>
+            </a:r>
+            <a:r>
+              <a:rPr lang="en-US" sz="1700" dirty="0">
+                <a:hlinkClick r:id="rId5"/>
+              </a:rPr>
+              <a:t>RFC 8040, </a:t>
+            </a:r>
+            <a:r>
+              <a:rPr lang="en-US" sz="1700" dirty="0"/>
+              <a:t>CBOR </a:t>
             </a:r>
             <a:r>
               <a:rPr lang="en-US" sz="1700" dirty="0">
@@ -6181,34 +6115,34 @@
             </a:r>
             <a:r>
               <a:rPr lang="en-US" sz="1700" dirty="0"/>
-              <a:t>the client can request to encode YANG notifications;</a:t>
+              <a:t>)</a:t>
             </a:r>
           </a:p>
           <a:p>
             <a:pPr lvl="1"/>
             <a:r>
               <a:rPr lang="en-US" sz="1700" dirty="0"/>
-              <a:t>Specification of secure transport mechanisms that are needed by the client to communicate with the server such as DTLS as defined in </a:t>
+              <a:t>Specification of which secure protocols are supported for the transport protocol (DTLS </a:t>
             </a:r>
             <a:r>
               <a:rPr lang="en-US" sz="1700" dirty="0">
                 <a:hlinkClick r:id="rId7"/>
               </a:rPr>
-              <a:t>RFC 9147 </a:t>
+              <a:t>RFC 9147</a:t>
             </a:r>
             <a:r>
               <a:rPr lang="en-US" sz="1700" dirty="0"/>
-              <a:t>TLS as defined in </a:t>
+              <a:t>, TLS </a:t>
             </a:r>
             <a:r>
               <a:rPr lang="en-US" sz="1700" dirty="0">
                 <a:hlinkClick r:id="rId8"/>
               </a:rPr>
-              <a:t>RFC 8446 </a:t>
+              <a:t>RFC 8446,</a:t>
             </a:r>
             <a:r>
               <a:rPr lang="en-US" sz="1700" dirty="0"/>
-              <a:t>or SSH as defined in </a:t>
+              <a:t> SSH </a:t>
             </a:r>
             <a:r>
               <a:rPr lang="en-US" sz="1700" dirty="0">
@@ -6218,7 +6152,7 @@
             </a:r>
             <a:r>
               <a:rPr lang="en-US" sz="1700" dirty="0"/>
-              <a:t>;</a:t>
+              <a:t>)</a:t>
             </a:r>
           </a:p>
         </p:txBody>

</xml_diff>